<commit_message>
feature(springboottesting): on the way, service mockito tests
</commit_message>
<xml_diff>
--- a/content/en/docs/java/spring-boot/spring-boot-testing/zwiebelprinzip.pptx
+++ b/content/en/docs/java/spring-boot/spring-boot-testing/zwiebelprinzip.pptx
@@ -6,6 +6,8 @@
   </p:sldMasterIdLst>
   <p:sldIdLst>
     <p:sldId id="257" r:id="rId2"/>
+    <p:sldId id="258" r:id="rId3"/>
+    <p:sldId id="259" r:id="rId4"/>
   </p:sldIdLst>
   <p:sldSz cx="12192000" cy="6858000"/>
   <p:notesSz cx="6858000" cy="9144000"/>
@@ -104,6 +106,11 @@
       </a:defRPr>
     </a:lvl9pPr>
   </p:defaultTextStyle>
+  <p:extLst>
+    <p:ext uri="{EFAFB233-063F-42B5-8137-9DF3F51BA10A}">
+      <p15:sldGuideLst xmlns:p15="http://schemas.microsoft.com/office/powerpoint/2012/main"/>
+    </p:ext>
+  </p:extLst>
 </p:presentation>
 </file>
 
@@ -256,7 +263,7 @@
           <a:p>
             <a:fld id="{CC485AA8-D36E-4B31-9BCC-E3E7E8DC6EC0}" type="datetimeFigureOut">
               <a:rPr lang="de-CH" smtClean="0"/>
-              <a:t>28.10.2024</a:t>
+              <a:t>31.10.2024</a:t>
             </a:fld>
             <a:endParaRPr lang="de-CH" dirty="0"/>
           </a:p>
@@ -456,7 +463,7 @@
           <a:p>
             <a:fld id="{CC485AA8-D36E-4B31-9BCC-E3E7E8DC6EC0}" type="datetimeFigureOut">
               <a:rPr lang="de-CH" smtClean="0"/>
-              <a:t>28.10.2024</a:t>
+              <a:t>31.10.2024</a:t>
             </a:fld>
             <a:endParaRPr lang="de-CH" dirty="0"/>
           </a:p>
@@ -666,7 +673,7 @@
           <a:p>
             <a:fld id="{CC485AA8-D36E-4B31-9BCC-E3E7E8DC6EC0}" type="datetimeFigureOut">
               <a:rPr lang="de-CH" smtClean="0"/>
-              <a:t>28.10.2024</a:t>
+              <a:t>31.10.2024</a:t>
             </a:fld>
             <a:endParaRPr lang="de-CH" dirty="0"/>
           </a:p>
@@ -866,7 +873,7 @@
           <a:p>
             <a:fld id="{CC485AA8-D36E-4B31-9BCC-E3E7E8DC6EC0}" type="datetimeFigureOut">
               <a:rPr lang="de-CH" smtClean="0"/>
-              <a:t>28.10.2024</a:t>
+              <a:t>31.10.2024</a:t>
             </a:fld>
             <a:endParaRPr lang="de-CH" dirty="0"/>
           </a:p>
@@ -1142,7 +1149,7 @@
           <a:p>
             <a:fld id="{CC485AA8-D36E-4B31-9BCC-E3E7E8DC6EC0}" type="datetimeFigureOut">
               <a:rPr lang="de-CH" smtClean="0"/>
-              <a:t>28.10.2024</a:t>
+              <a:t>31.10.2024</a:t>
             </a:fld>
             <a:endParaRPr lang="de-CH" dirty="0"/>
           </a:p>
@@ -1410,7 +1417,7 @@
           <a:p>
             <a:fld id="{CC485AA8-D36E-4B31-9BCC-E3E7E8DC6EC0}" type="datetimeFigureOut">
               <a:rPr lang="de-CH" smtClean="0"/>
-              <a:t>28.10.2024</a:t>
+              <a:t>31.10.2024</a:t>
             </a:fld>
             <a:endParaRPr lang="de-CH" dirty="0"/>
           </a:p>
@@ -1825,7 +1832,7 @@
           <a:p>
             <a:fld id="{CC485AA8-D36E-4B31-9BCC-E3E7E8DC6EC0}" type="datetimeFigureOut">
               <a:rPr lang="de-CH" smtClean="0"/>
-              <a:t>28.10.2024</a:t>
+              <a:t>31.10.2024</a:t>
             </a:fld>
             <a:endParaRPr lang="de-CH" dirty="0"/>
           </a:p>
@@ -1967,7 +1974,7 @@
           <a:p>
             <a:fld id="{CC485AA8-D36E-4B31-9BCC-E3E7E8DC6EC0}" type="datetimeFigureOut">
               <a:rPr lang="de-CH" smtClean="0"/>
-              <a:t>28.10.2024</a:t>
+              <a:t>31.10.2024</a:t>
             </a:fld>
             <a:endParaRPr lang="de-CH" dirty="0"/>
           </a:p>
@@ -2080,7 +2087,7 @@
           <a:p>
             <a:fld id="{CC485AA8-D36E-4B31-9BCC-E3E7E8DC6EC0}" type="datetimeFigureOut">
               <a:rPr lang="de-CH" smtClean="0"/>
-              <a:t>28.10.2024</a:t>
+              <a:t>31.10.2024</a:t>
             </a:fld>
             <a:endParaRPr lang="de-CH" dirty="0"/>
           </a:p>
@@ -2393,7 +2400,7 @@
           <a:p>
             <a:fld id="{CC485AA8-D36E-4B31-9BCC-E3E7E8DC6EC0}" type="datetimeFigureOut">
               <a:rPr lang="de-CH" smtClean="0"/>
-              <a:t>28.10.2024</a:t>
+              <a:t>31.10.2024</a:t>
             </a:fld>
             <a:endParaRPr lang="de-CH" dirty="0"/>
           </a:p>
@@ -2682,7 +2689,7 @@
           <a:p>
             <a:fld id="{CC485AA8-D36E-4B31-9BCC-E3E7E8DC6EC0}" type="datetimeFigureOut">
               <a:rPr lang="de-CH" smtClean="0"/>
-              <a:t>28.10.2024</a:t>
+              <a:t>31.10.2024</a:t>
             </a:fld>
             <a:endParaRPr lang="de-CH" dirty="0"/>
           </a:p>
@@ -2925,7 +2932,7 @@
           <a:p>
             <a:fld id="{CC485AA8-D36E-4B31-9BCC-E3E7E8DC6EC0}" type="datetimeFigureOut">
               <a:rPr lang="de-CH" smtClean="0"/>
-              <a:t>28.10.2024</a:t>
+              <a:t>31.10.2024</a:t>
             </a:fld>
             <a:endParaRPr lang="de-CH" dirty="0"/>
           </a:p>
@@ -3858,7 +3865,7 @@
           <a:lstStyle/>
           <a:p>
             <a:pPr algn="ctr"/>
-            <a:endParaRPr lang="de-CH"/>
+            <a:endParaRPr lang="de-CH" dirty="0"/>
           </a:p>
         </p:txBody>
       </p:sp>
@@ -3910,7 +3917,7 @@
           <a:lstStyle/>
           <a:p>
             <a:pPr algn="ctr"/>
-            <a:endParaRPr lang="de-CH">
+            <a:endParaRPr lang="de-CH" dirty="0">
               <a:solidFill>
                 <a:srgbClr val="00B050"/>
               </a:solidFill>
@@ -4009,7 +4016,7 @@
           <a:lstStyle/>
           <a:p>
             <a:pPr algn="ctr"/>
-            <a:endParaRPr lang="de-CH">
+            <a:endParaRPr lang="de-CH" dirty="0">
               <a:solidFill>
                 <a:srgbClr val="00B050"/>
               </a:solidFill>
@@ -4108,7 +4115,7 @@
           <a:lstStyle/>
           <a:p>
             <a:pPr algn="ctr"/>
-            <a:endParaRPr lang="de-CH">
+            <a:endParaRPr lang="de-CH" dirty="0">
               <a:solidFill>
                 <a:srgbClr val="00B050"/>
               </a:solidFill>
@@ -4604,7 +4611,7 @@
           <a:lstStyle/>
           <a:p>
             <a:pPr algn="ctr"/>
-            <a:endParaRPr lang="de-CH">
+            <a:endParaRPr lang="de-CH" dirty="0">
               <a:solidFill>
                 <a:srgbClr val="00B050"/>
               </a:solidFill>
@@ -4641,18 +4648,6 @@
           <a:lstStyle/>
           <a:p>
             <a:pPr algn="ctr"/>
-            <a:r>
-              <a:rPr lang="de-CH" dirty="0" err="1">
-                <a:solidFill>
-                  <a:schemeClr val="accent5">
-                    <a:lumMod val="60000"/>
-                    <a:lumOff val="40000"/>
-                  </a:schemeClr>
-                </a:solidFill>
-                <a:latin typeface="SBB Light" pitchFamily="2" charset="0"/>
-              </a:rPr>
-              <a:t>Mockito</a:t>
-            </a:r>
             <a:r>
               <a:rPr lang="de-CH" dirty="0">
                 <a:solidFill>
@@ -4663,7 +4658,7 @@
                 </a:solidFill>
                 <a:latin typeface="SBB Light" pitchFamily="2" charset="0"/>
               </a:rPr>
-              <a:t>-Test</a:t>
+              <a:t>Mockito-Test</a:t>
             </a:r>
           </a:p>
         </p:txBody>
@@ -4854,6 +4849,1577 @@
     <p:extLst>
       <p:ext uri="{BB962C8B-B14F-4D97-AF65-F5344CB8AC3E}">
         <p14:creationId xmlns:p14="http://schemas.microsoft.com/office/powerpoint/2010/main" val="3065801828"/>
+      </p:ext>
+    </p:extLst>
+  </p:cSld>
+  <p:clrMapOvr>
+    <a:masterClrMapping/>
+  </p:clrMapOvr>
+</p:sld>
+</file>
+
+<file path=ppt/slides/slide2.xml><?xml version="1.0" encoding="utf-8"?>
+<p:sld xmlns:a="http://schemas.openxmlformats.org/drawingml/2006/main" xmlns:r="http://schemas.openxmlformats.org/officeDocument/2006/relationships" xmlns:p="http://schemas.openxmlformats.org/presentationml/2006/main">
+  <p:cSld>
+    <p:spTree>
+      <p:nvGrpSpPr>
+        <p:cNvPr id="1" name=""/>
+        <p:cNvGrpSpPr/>
+        <p:nvPr/>
+      </p:nvGrpSpPr>
+      <p:grpSpPr>
+        <a:xfrm>
+          <a:off x="0" y="0"/>
+          <a:ext cx="0" cy="0"/>
+          <a:chOff x="0" y="0"/>
+          <a:chExt cx="0" cy="0"/>
+        </a:xfrm>
+      </p:grpSpPr>
+      <p:sp>
+        <p:nvSpPr>
+          <p:cNvPr id="2" name="Bogen 1">
+            <a:extLst>
+              <a:ext uri="{FF2B5EF4-FFF2-40B4-BE49-F238E27FC236}">
+                <a16:creationId xmlns:a16="http://schemas.microsoft.com/office/drawing/2014/main" id="{1881034C-63D0-E5C0-A397-8FD4EF8DEC44}"/>
+              </a:ext>
+            </a:extLst>
+          </p:cNvPr>
+          <p:cNvSpPr/>
+          <p:nvPr/>
+        </p:nvSpPr>
+        <p:spPr>
+          <a:xfrm>
+            <a:off x="1129381" y="662597"/>
+            <a:ext cx="1133856" cy="768096"/>
+          </a:xfrm>
+          <a:prstGeom prst="arc">
+            <a:avLst>
+              <a:gd name="adj1" fmla="val 16200000"/>
+              <a:gd name="adj2" fmla="val 5342758"/>
+            </a:avLst>
+          </a:prstGeom>
+        </p:spPr>
+        <p:style>
+          <a:lnRef idx="2">
+            <a:schemeClr val="dk1"/>
+          </a:lnRef>
+          <a:fillRef idx="0">
+            <a:schemeClr val="dk1"/>
+          </a:fillRef>
+          <a:effectRef idx="1">
+            <a:schemeClr val="dk1"/>
+          </a:effectRef>
+          <a:fontRef idx="minor">
+            <a:schemeClr val="tx1"/>
+          </a:fontRef>
+        </p:style>
+        <p:txBody>
+          <a:bodyPr rtlCol="0" anchor="ctr"/>
+          <a:lstStyle/>
+          <a:p>
+            <a:pPr algn="ctr"/>
+            <a:endParaRPr lang="de-CH" dirty="0"/>
+          </a:p>
+        </p:txBody>
+      </p:sp>
+      <p:sp>
+        <p:nvSpPr>
+          <p:cNvPr id="3" name="Textfeld 2">
+            <a:extLst>
+              <a:ext uri="{FF2B5EF4-FFF2-40B4-BE49-F238E27FC236}">
+                <a16:creationId xmlns:a16="http://schemas.microsoft.com/office/drawing/2014/main" id="{8CF095A7-C0EC-8946-196B-1D96F26356BD}"/>
+              </a:ext>
+            </a:extLst>
+          </p:cNvPr>
+          <p:cNvSpPr txBox="1"/>
+          <p:nvPr/>
+        </p:nvSpPr>
+        <p:spPr>
+          <a:xfrm>
+            <a:off x="1124796" y="705191"/>
+            <a:ext cx="880241" cy="646331"/>
+          </a:xfrm>
+          <a:prstGeom prst="rect">
+            <a:avLst/>
+          </a:prstGeom>
+          <a:noFill/>
+        </p:spPr>
+        <p:txBody>
+          <a:bodyPr wrap="none" rtlCol="0">
+            <a:spAutoFit/>
+          </a:bodyPr>
+          <a:lstStyle/>
+          <a:p>
+            <a:pPr algn="ctr"/>
+            <a:r>
+              <a:rPr lang="de-CH" b="1" dirty="0">
+                <a:latin typeface="SBB Light" pitchFamily="2" charset="0"/>
+              </a:rPr>
+              <a:t>Entity</a:t>
+            </a:r>
+          </a:p>
+          <a:p>
+            <a:pPr algn="ctr"/>
+            <a:r>
+              <a:rPr lang="de-CH" dirty="0">
+                <a:latin typeface="SBB Light" pitchFamily="2" charset="0"/>
+              </a:rPr>
+              <a:t>Person</a:t>
+            </a:r>
+          </a:p>
+        </p:txBody>
+      </p:sp>
+      <p:sp>
+        <p:nvSpPr>
+          <p:cNvPr id="4" name="Textfeld 3">
+            <a:extLst>
+              <a:ext uri="{FF2B5EF4-FFF2-40B4-BE49-F238E27FC236}">
+                <a16:creationId xmlns:a16="http://schemas.microsoft.com/office/drawing/2014/main" id="{21DCE104-654C-8C95-5AE7-74D555D6CA84}"/>
+              </a:ext>
+            </a:extLst>
+          </p:cNvPr>
+          <p:cNvSpPr txBox="1"/>
+          <p:nvPr/>
+        </p:nvSpPr>
+        <p:spPr>
+          <a:xfrm>
+            <a:off x="2131767" y="705190"/>
+            <a:ext cx="1631085" cy="646331"/>
+          </a:xfrm>
+          <a:prstGeom prst="rect">
+            <a:avLst/>
+          </a:prstGeom>
+          <a:noFill/>
+        </p:spPr>
+        <p:txBody>
+          <a:bodyPr wrap="square" rtlCol="0">
+            <a:spAutoFit/>
+          </a:bodyPr>
+          <a:lstStyle/>
+          <a:p>
+            <a:pPr algn="ctr"/>
+            <a:r>
+              <a:rPr lang="de-CH" b="1" dirty="0">
+                <a:latin typeface="SBB Light" pitchFamily="2" charset="0"/>
+              </a:rPr>
+              <a:t>Repo</a:t>
+            </a:r>
+          </a:p>
+          <a:p>
+            <a:pPr algn="ctr"/>
+            <a:r>
+              <a:rPr lang="de-CH" dirty="0">
+                <a:latin typeface="SBB Light" pitchFamily="2" charset="0"/>
+              </a:rPr>
+              <a:t>PersonRepo</a:t>
+            </a:r>
+          </a:p>
+        </p:txBody>
+      </p:sp>
+      <p:sp>
+        <p:nvSpPr>
+          <p:cNvPr id="5" name="Textfeld 4">
+            <a:extLst>
+              <a:ext uri="{FF2B5EF4-FFF2-40B4-BE49-F238E27FC236}">
+                <a16:creationId xmlns:a16="http://schemas.microsoft.com/office/drawing/2014/main" id="{CF148F95-D0F0-9C92-3C24-5B368411012D}"/>
+              </a:ext>
+            </a:extLst>
+          </p:cNvPr>
+          <p:cNvSpPr txBox="1"/>
+          <p:nvPr/>
+        </p:nvSpPr>
+        <p:spPr>
+          <a:xfrm>
+            <a:off x="3762852" y="705111"/>
+            <a:ext cx="1631085" cy="646331"/>
+          </a:xfrm>
+          <a:prstGeom prst="rect">
+            <a:avLst/>
+          </a:prstGeom>
+          <a:noFill/>
+        </p:spPr>
+        <p:txBody>
+          <a:bodyPr wrap="square" rtlCol="0">
+            <a:spAutoFit/>
+          </a:bodyPr>
+          <a:lstStyle/>
+          <a:p>
+            <a:pPr algn="ctr"/>
+            <a:r>
+              <a:rPr lang="de-CH" b="1" dirty="0">
+                <a:latin typeface="SBB Light" pitchFamily="2" charset="0"/>
+              </a:rPr>
+              <a:t>Service</a:t>
+            </a:r>
+          </a:p>
+          <a:p>
+            <a:pPr algn="ctr"/>
+            <a:r>
+              <a:rPr lang="de-CH" dirty="0">
+                <a:latin typeface="SBB Light" pitchFamily="2" charset="0"/>
+              </a:rPr>
+              <a:t>PersonService</a:t>
+            </a:r>
+          </a:p>
+        </p:txBody>
+      </p:sp>
+      <p:sp>
+        <p:nvSpPr>
+          <p:cNvPr id="6" name="Textfeld 5">
+            <a:extLst>
+              <a:ext uri="{FF2B5EF4-FFF2-40B4-BE49-F238E27FC236}">
+                <a16:creationId xmlns:a16="http://schemas.microsoft.com/office/drawing/2014/main" id="{CAE6670B-D17D-858C-3604-3307F1E5EE6E}"/>
+              </a:ext>
+            </a:extLst>
+          </p:cNvPr>
+          <p:cNvSpPr txBox="1"/>
+          <p:nvPr/>
+        </p:nvSpPr>
+        <p:spPr>
+          <a:xfrm>
+            <a:off x="5393937" y="705111"/>
+            <a:ext cx="2038708" cy="646331"/>
+          </a:xfrm>
+          <a:prstGeom prst="rect">
+            <a:avLst/>
+          </a:prstGeom>
+          <a:noFill/>
+        </p:spPr>
+        <p:txBody>
+          <a:bodyPr wrap="square" rtlCol="0">
+            <a:spAutoFit/>
+          </a:bodyPr>
+          <a:lstStyle/>
+          <a:p>
+            <a:pPr algn="ctr"/>
+            <a:r>
+              <a:rPr lang="de-CH" b="1" dirty="0">
+                <a:latin typeface="SBB Light" pitchFamily="2" charset="0"/>
+              </a:rPr>
+              <a:t>Controller</a:t>
+            </a:r>
+          </a:p>
+          <a:p>
+            <a:pPr algn="ctr"/>
+            <a:r>
+              <a:rPr lang="de-CH" dirty="0">
+                <a:latin typeface="SBB Light" pitchFamily="2" charset="0"/>
+              </a:rPr>
+              <a:t>PersonController</a:t>
+            </a:r>
+          </a:p>
+        </p:txBody>
+      </p:sp>
+      <p:sp>
+        <p:nvSpPr>
+          <p:cNvPr id="7" name="Textfeld 6">
+            <a:extLst>
+              <a:ext uri="{FF2B5EF4-FFF2-40B4-BE49-F238E27FC236}">
+                <a16:creationId xmlns:a16="http://schemas.microsoft.com/office/drawing/2014/main" id="{2214395B-5F3A-4763-5536-87301F634E10}"/>
+              </a:ext>
+            </a:extLst>
+          </p:cNvPr>
+          <p:cNvSpPr txBox="1"/>
+          <p:nvPr/>
+        </p:nvSpPr>
+        <p:spPr>
+          <a:xfrm>
+            <a:off x="3559040" y="1867297"/>
+            <a:ext cx="2038708" cy="646331"/>
+          </a:xfrm>
+          <a:prstGeom prst="rect">
+            <a:avLst/>
+          </a:prstGeom>
+          <a:noFill/>
+        </p:spPr>
+        <p:txBody>
+          <a:bodyPr wrap="square" rtlCol="0">
+            <a:spAutoFit/>
+          </a:bodyPr>
+          <a:lstStyle/>
+          <a:p>
+            <a:pPr algn="ctr"/>
+            <a:r>
+              <a:rPr lang="de-CH" b="1" dirty="0">
+                <a:latin typeface="SBB Light" pitchFamily="2" charset="0"/>
+              </a:rPr>
+              <a:t>Utility</a:t>
+            </a:r>
+          </a:p>
+          <a:p>
+            <a:pPr algn="ctr"/>
+            <a:r>
+              <a:rPr lang="de-CH" dirty="0">
+                <a:latin typeface="SBB Light" pitchFamily="2" charset="0"/>
+              </a:rPr>
+              <a:t>MyUtilityBean</a:t>
+            </a:r>
+          </a:p>
+        </p:txBody>
+      </p:sp>
+      <p:sp>
+        <p:nvSpPr>
+          <p:cNvPr id="8" name="Bogen 7">
+            <a:extLst>
+              <a:ext uri="{FF2B5EF4-FFF2-40B4-BE49-F238E27FC236}">
+                <a16:creationId xmlns:a16="http://schemas.microsoft.com/office/drawing/2014/main" id="{55243E72-C79D-D5C5-58C4-8A95F1770262}"/>
+              </a:ext>
+            </a:extLst>
+          </p:cNvPr>
+          <p:cNvSpPr/>
+          <p:nvPr/>
+        </p:nvSpPr>
+        <p:spPr>
+          <a:xfrm>
+            <a:off x="2131767" y="443141"/>
+            <a:ext cx="1631085" cy="1234204"/>
+          </a:xfrm>
+          <a:prstGeom prst="arc">
+            <a:avLst>
+              <a:gd name="adj1" fmla="val 16690684"/>
+              <a:gd name="adj2" fmla="val 4979617"/>
+            </a:avLst>
+          </a:prstGeom>
+        </p:spPr>
+        <p:style>
+          <a:lnRef idx="2">
+            <a:schemeClr val="dk1"/>
+          </a:lnRef>
+          <a:fillRef idx="0">
+            <a:schemeClr val="dk1"/>
+          </a:fillRef>
+          <a:effectRef idx="1">
+            <a:schemeClr val="dk1"/>
+          </a:effectRef>
+          <a:fontRef idx="minor">
+            <a:schemeClr val="tx1"/>
+          </a:fontRef>
+        </p:style>
+        <p:txBody>
+          <a:bodyPr rtlCol="0" anchor="ctr"/>
+          <a:lstStyle/>
+          <a:p>
+            <a:pPr algn="ctr"/>
+            <a:endParaRPr lang="de-CH" dirty="0"/>
+          </a:p>
+        </p:txBody>
+      </p:sp>
+      <p:sp>
+        <p:nvSpPr>
+          <p:cNvPr id="9" name="Bogen 8">
+            <a:extLst>
+              <a:ext uri="{FF2B5EF4-FFF2-40B4-BE49-F238E27FC236}">
+                <a16:creationId xmlns:a16="http://schemas.microsoft.com/office/drawing/2014/main" id="{22360D6B-4116-27D1-223C-70ABD31F412A}"/>
+              </a:ext>
+            </a:extLst>
+          </p:cNvPr>
+          <p:cNvSpPr/>
+          <p:nvPr/>
+        </p:nvSpPr>
+        <p:spPr>
+          <a:xfrm>
+            <a:off x="2269333" y="296837"/>
+            <a:ext cx="3236976" cy="1511808"/>
+          </a:xfrm>
+          <a:prstGeom prst="arc">
+            <a:avLst>
+              <a:gd name="adj1" fmla="val 19063385"/>
+              <a:gd name="adj2" fmla="val 2604375"/>
+            </a:avLst>
+          </a:prstGeom>
+        </p:spPr>
+        <p:style>
+          <a:lnRef idx="2">
+            <a:schemeClr val="dk1"/>
+          </a:lnRef>
+          <a:fillRef idx="0">
+            <a:schemeClr val="dk1"/>
+          </a:fillRef>
+          <a:effectRef idx="1">
+            <a:schemeClr val="dk1"/>
+          </a:effectRef>
+          <a:fontRef idx="minor">
+            <a:schemeClr val="tx1"/>
+          </a:fontRef>
+        </p:style>
+        <p:txBody>
+          <a:bodyPr rtlCol="0" anchor="ctr"/>
+          <a:lstStyle/>
+          <a:p>
+            <a:pPr algn="ctr"/>
+            <a:endParaRPr lang="de-CH" dirty="0"/>
+          </a:p>
+        </p:txBody>
+      </p:sp>
+      <p:sp>
+        <p:nvSpPr>
+          <p:cNvPr id="10" name="Bogen 9">
+            <a:extLst>
+              <a:ext uri="{FF2B5EF4-FFF2-40B4-BE49-F238E27FC236}">
+                <a16:creationId xmlns:a16="http://schemas.microsoft.com/office/drawing/2014/main" id="{1E5D31C7-ABB2-ACB5-6911-B461628E14AE}"/>
+              </a:ext>
+            </a:extLst>
+          </p:cNvPr>
+          <p:cNvSpPr/>
+          <p:nvPr/>
+        </p:nvSpPr>
+        <p:spPr>
+          <a:xfrm>
+            <a:off x="3768949" y="187109"/>
+            <a:ext cx="3675888" cy="1746268"/>
+          </a:xfrm>
+          <a:prstGeom prst="arc">
+            <a:avLst>
+              <a:gd name="adj1" fmla="val 18736987"/>
+              <a:gd name="adj2" fmla="val 2822498"/>
+            </a:avLst>
+          </a:prstGeom>
+        </p:spPr>
+        <p:style>
+          <a:lnRef idx="2">
+            <a:schemeClr val="dk1"/>
+          </a:lnRef>
+          <a:fillRef idx="0">
+            <a:schemeClr val="dk1"/>
+          </a:fillRef>
+          <a:effectRef idx="1">
+            <a:schemeClr val="dk1"/>
+          </a:effectRef>
+          <a:fontRef idx="minor">
+            <a:schemeClr val="tx1"/>
+          </a:fontRef>
+        </p:style>
+        <p:txBody>
+          <a:bodyPr rtlCol="0" anchor="ctr"/>
+          <a:lstStyle/>
+          <a:p>
+            <a:pPr algn="ctr"/>
+            <a:endParaRPr lang="de-CH" dirty="0"/>
+          </a:p>
+        </p:txBody>
+      </p:sp>
+      <p:cxnSp>
+        <p:nvCxnSpPr>
+          <p:cNvPr id="12" name="Verbinder: gewinkelt 11">
+            <a:extLst>
+              <a:ext uri="{FF2B5EF4-FFF2-40B4-BE49-F238E27FC236}">
+                <a16:creationId xmlns:a16="http://schemas.microsoft.com/office/drawing/2014/main" id="{EDDC4843-E69A-F607-E77F-82B7BD008A0F}"/>
+              </a:ext>
+            </a:extLst>
+          </p:cNvPr>
+          <p:cNvCxnSpPr>
+            <a:cxnSpLocks/>
+            <a:stCxn id="5" idx="2"/>
+            <a:endCxn id="14" idx="0"/>
+          </p:cNvCxnSpPr>
+          <p:nvPr/>
+        </p:nvCxnSpPr>
+        <p:spPr>
+          <a:xfrm rot="5400000">
+            <a:off x="4340638" y="1589199"/>
+            <a:ext cx="475514" cy="1"/>
+          </a:xfrm>
+          <a:prstGeom prst="bentConnector3">
+            <a:avLst/>
+          </a:prstGeom>
+          <a:ln>
+            <a:headEnd type="none"/>
+            <a:tailEnd type="arrow"/>
+          </a:ln>
+        </p:spPr>
+        <p:style>
+          <a:lnRef idx="2">
+            <a:schemeClr val="dk1"/>
+          </a:lnRef>
+          <a:fillRef idx="0">
+            <a:schemeClr val="dk1"/>
+          </a:fillRef>
+          <a:effectRef idx="1">
+            <a:schemeClr val="dk1"/>
+          </a:effectRef>
+          <a:fontRef idx="minor">
+            <a:schemeClr val="tx1"/>
+          </a:fontRef>
+        </p:style>
+      </p:cxnSp>
+      <p:sp>
+        <p:nvSpPr>
+          <p:cNvPr id="14" name="Rechteck: abgerundete Ecken 13">
+            <a:extLst>
+              <a:ext uri="{FF2B5EF4-FFF2-40B4-BE49-F238E27FC236}">
+                <a16:creationId xmlns:a16="http://schemas.microsoft.com/office/drawing/2014/main" id="{B83F6205-5409-D00E-38DA-A7B840E58487}"/>
+              </a:ext>
+            </a:extLst>
+          </p:cNvPr>
+          <p:cNvSpPr/>
+          <p:nvPr/>
+        </p:nvSpPr>
+        <p:spPr>
+          <a:xfrm>
+            <a:off x="3762852" y="1826956"/>
+            <a:ext cx="1631084" cy="691663"/>
+          </a:xfrm>
+          <a:prstGeom prst="roundRect">
+            <a:avLst/>
+          </a:prstGeom>
+          <a:noFill/>
+          <a:ln>
+            <a:solidFill>
+              <a:schemeClr val="tx1"/>
+            </a:solidFill>
+            <a:prstDash val="dash"/>
+          </a:ln>
+        </p:spPr>
+        <p:style>
+          <a:lnRef idx="2">
+            <a:schemeClr val="accent1">
+              <a:shade val="15000"/>
+            </a:schemeClr>
+          </a:lnRef>
+          <a:fillRef idx="1">
+            <a:schemeClr val="accent1"/>
+          </a:fillRef>
+          <a:effectRef idx="0">
+            <a:schemeClr val="accent1"/>
+          </a:effectRef>
+          <a:fontRef idx="minor">
+            <a:schemeClr val="lt1"/>
+          </a:fontRef>
+        </p:style>
+        <p:txBody>
+          <a:bodyPr rtlCol="0" anchor="ctr"/>
+          <a:lstStyle/>
+          <a:p>
+            <a:pPr algn="ctr"/>
+            <a:endParaRPr lang="de-CH" dirty="0"/>
+          </a:p>
+        </p:txBody>
+      </p:sp>
+      <p:sp>
+        <p:nvSpPr>
+          <p:cNvPr id="23" name="Zylinder 22">
+            <a:extLst>
+              <a:ext uri="{FF2B5EF4-FFF2-40B4-BE49-F238E27FC236}">
+                <a16:creationId xmlns:a16="http://schemas.microsoft.com/office/drawing/2014/main" id="{5E43EF65-3933-D626-7B2D-2612BDD100BB}"/>
+              </a:ext>
+            </a:extLst>
+          </p:cNvPr>
+          <p:cNvSpPr/>
+          <p:nvPr/>
+        </p:nvSpPr>
+        <p:spPr>
+          <a:xfrm>
+            <a:off x="304740" y="589629"/>
+            <a:ext cx="591671" cy="908299"/>
+          </a:xfrm>
+          <a:prstGeom prst="can">
+            <a:avLst/>
+          </a:prstGeom>
+          <a:noFill/>
+        </p:spPr>
+        <p:style>
+          <a:lnRef idx="2">
+            <a:schemeClr val="accent1">
+              <a:shade val="15000"/>
+            </a:schemeClr>
+          </a:lnRef>
+          <a:fillRef idx="1">
+            <a:schemeClr val="accent1"/>
+          </a:fillRef>
+          <a:effectRef idx="0">
+            <a:schemeClr val="accent1"/>
+          </a:effectRef>
+          <a:fontRef idx="minor">
+            <a:schemeClr val="lt1"/>
+          </a:fontRef>
+        </p:style>
+        <p:txBody>
+          <a:bodyPr rtlCol="0" anchor="ctr"/>
+          <a:lstStyle/>
+          <a:p>
+            <a:pPr algn="ctr"/>
+            <a:r>
+              <a:rPr lang="de-CH" sz="1400" dirty="0">
+                <a:solidFill>
+                  <a:schemeClr val="tx1"/>
+                </a:solidFill>
+                <a:latin typeface="SBB Light" pitchFamily="2" charset="0"/>
+              </a:rPr>
+              <a:t>Database</a:t>
+            </a:r>
+          </a:p>
+        </p:txBody>
+      </p:sp>
+    </p:spTree>
+    <p:extLst>
+      <p:ext uri="{BB962C8B-B14F-4D97-AF65-F5344CB8AC3E}">
+        <p14:creationId xmlns:p14="http://schemas.microsoft.com/office/powerpoint/2010/main" val="2164415726"/>
+      </p:ext>
+    </p:extLst>
+  </p:cSld>
+  <p:clrMapOvr>
+    <a:masterClrMapping/>
+  </p:clrMapOvr>
+</p:sld>
+</file>
+
+<file path=ppt/slides/slide3.xml><?xml version="1.0" encoding="utf-8"?>
+<p:sld xmlns:a="http://schemas.openxmlformats.org/drawingml/2006/main" xmlns:r="http://schemas.openxmlformats.org/officeDocument/2006/relationships" xmlns:p="http://schemas.openxmlformats.org/presentationml/2006/main">
+  <p:cSld>
+    <p:spTree>
+      <p:nvGrpSpPr>
+        <p:cNvPr id="1" name=""/>
+        <p:cNvGrpSpPr/>
+        <p:nvPr/>
+      </p:nvGrpSpPr>
+      <p:grpSpPr>
+        <a:xfrm>
+          <a:off x="0" y="0"/>
+          <a:ext cx="0" cy="0"/>
+          <a:chOff x="0" y="0"/>
+          <a:chExt cx="0" cy="0"/>
+        </a:xfrm>
+      </p:grpSpPr>
+      <p:sp>
+        <p:nvSpPr>
+          <p:cNvPr id="2" name="Bogen 1">
+            <a:extLst>
+              <a:ext uri="{FF2B5EF4-FFF2-40B4-BE49-F238E27FC236}">
+                <a16:creationId xmlns:a16="http://schemas.microsoft.com/office/drawing/2014/main" id="{1881034C-63D0-E5C0-A397-8FD4EF8DEC44}"/>
+              </a:ext>
+            </a:extLst>
+          </p:cNvPr>
+          <p:cNvSpPr/>
+          <p:nvPr/>
+        </p:nvSpPr>
+        <p:spPr>
+          <a:xfrm>
+            <a:off x="1292968" y="750681"/>
+            <a:ext cx="1133856" cy="768096"/>
+          </a:xfrm>
+          <a:prstGeom prst="arc">
+            <a:avLst>
+              <a:gd name="adj1" fmla="val 16200000"/>
+              <a:gd name="adj2" fmla="val 5342758"/>
+            </a:avLst>
+          </a:prstGeom>
+        </p:spPr>
+        <p:style>
+          <a:lnRef idx="2">
+            <a:schemeClr val="dk1"/>
+          </a:lnRef>
+          <a:fillRef idx="0">
+            <a:schemeClr val="dk1"/>
+          </a:fillRef>
+          <a:effectRef idx="1">
+            <a:schemeClr val="dk1"/>
+          </a:effectRef>
+          <a:fontRef idx="minor">
+            <a:schemeClr val="tx1"/>
+          </a:fontRef>
+        </p:style>
+        <p:txBody>
+          <a:bodyPr rtlCol="0" anchor="ctr"/>
+          <a:lstStyle/>
+          <a:p>
+            <a:pPr algn="ctr"/>
+            <a:endParaRPr lang="de-CH" dirty="0"/>
+          </a:p>
+        </p:txBody>
+      </p:sp>
+      <p:sp>
+        <p:nvSpPr>
+          <p:cNvPr id="3" name="Textfeld 2">
+            <a:extLst>
+              <a:ext uri="{FF2B5EF4-FFF2-40B4-BE49-F238E27FC236}">
+                <a16:creationId xmlns:a16="http://schemas.microsoft.com/office/drawing/2014/main" id="{8CF095A7-C0EC-8946-196B-1D96F26356BD}"/>
+              </a:ext>
+            </a:extLst>
+          </p:cNvPr>
+          <p:cNvSpPr txBox="1"/>
+          <p:nvPr/>
+        </p:nvSpPr>
+        <p:spPr>
+          <a:xfrm>
+            <a:off x="1288383" y="793275"/>
+            <a:ext cx="880241" cy="646331"/>
+          </a:xfrm>
+          <a:prstGeom prst="rect">
+            <a:avLst/>
+          </a:prstGeom>
+          <a:noFill/>
+        </p:spPr>
+        <p:txBody>
+          <a:bodyPr wrap="none" rtlCol="0">
+            <a:spAutoFit/>
+          </a:bodyPr>
+          <a:lstStyle/>
+          <a:p>
+            <a:pPr algn="ctr"/>
+            <a:r>
+              <a:rPr lang="de-CH" b="1" dirty="0">
+                <a:latin typeface="SBB Light" pitchFamily="2" charset="0"/>
+              </a:rPr>
+              <a:t>Entity</a:t>
+            </a:r>
+          </a:p>
+          <a:p>
+            <a:pPr algn="ctr"/>
+            <a:r>
+              <a:rPr lang="de-CH" dirty="0">
+                <a:latin typeface="SBB Light" pitchFamily="2" charset="0"/>
+              </a:rPr>
+              <a:t>Person</a:t>
+            </a:r>
+          </a:p>
+        </p:txBody>
+      </p:sp>
+      <p:sp>
+        <p:nvSpPr>
+          <p:cNvPr id="4" name="Textfeld 3">
+            <a:extLst>
+              <a:ext uri="{FF2B5EF4-FFF2-40B4-BE49-F238E27FC236}">
+                <a16:creationId xmlns:a16="http://schemas.microsoft.com/office/drawing/2014/main" id="{21DCE104-654C-8C95-5AE7-74D555D6CA84}"/>
+              </a:ext>
+            </a:extLst>
+          </p:cNvPr>
+          <p:cNvSpPr txBox="1"/>
+          <p:nvPr/>
+        </p:nvSpPr>
+        <p:spPr>
+          <a:xfrm>
+            <a:off x="2295354" y="793274"/>
+            <a:ext cx="1631085" cy="646331"/>
+          </a:xfrm>
+          <a:prstGeom prst="rect">
+            <a:avLst/>
+          </a:prstGeom>
+          <a:noFill/>
+        </p:spPr>
+        <p:txBody>
+          <a:bodyPr wrap="square" rtlCol="0">
+            <a:spAutoFit/>
+          </a:bodyPr>
+          <a:lstStyle/>
+          <a:p>
+            <a:pPr algn="ctr"/>
+            <a:r>
+              <a:rPr lang="de-CH" b="1" dirty="0">
+                <a:latin typeface="SBB Light" pitchFamily="2" charset="0"/>
+              </a:rPr>
+              <a:t>Repo</a:t>
+            </a:r>
+          </a:p>
+          <a:p>
+            <a:pPr algn="ctr"/>
+            <a:r>
+              <a:rPr lang="de-CH" dirty="0">
+                <a:latin typeface="SBB Light" pitchFamily="2" charset="0"/>
+              </a:rPr>
+              <a:t>PersonRepo</a:t>
+            </a:r>
+          </a:p>
+        </p:txBody>
+      </p:sp>
+      <p:sp>
+        <p:nvSpPr>
+          <p:cNvPr id="5" name="Textfeld 4">
+            <a:extLst>
+              <a:ext uri="{FF2B5EF4-FFF2-40B4-BE49-F238E27FC236}">
+                <a16:creationId xmlns:a16="http://schemas.microsoft.com/office/drawing/2014/main" id="{CF148F95-D0F0-9C92-3C24-5B368411012D}"/>
+              </a:ext>
+            </a:extLst>
+          </p:cNvPr>
+          <p:cNvSpPr txBox="1"/>
+          <p:nvPr/>
+        </p:nvSpPr>
+        <p:spPr>
+          <a:xfrm>
+            <a:off x="3926439" y="793195"/>
+            <a:ext cx="1631085" cy="646331"/>
+          </a:xfrm>
+          <a:prstGeom prst="rect">
+            <a:avLst/>
+          </a:prstGeom>
+          <a:noFill/>
+        </p:spPr>
+        <p:txBody>
+          <a:bodyPr wrap="square" rtlCol="0">
+            <a:spAutoFit/>
+          </a:bodyPr>
+          <a:lstStyle/>
+          <a:p>
+            <a:pPr algn="ctr"/>
+            <a:r>
+              <a:rPr lang="de-CH" b="1" dirty="0">
+                <a:latin typeface="SBB Light" pitchFamily="2" charset="0"/>
+              </a:rPr>
+              <a:t>Service</a:t>
+            </a:r>
+          </a:p>
+          <a:p>
+            <a:pPr algn="ctr"/>
+            <a:r>
+              <a:rPr lang="de-CH" dirty="0">
+                <a:latin typeface="SBB Light" pitchFamily="2" charset="0"/>
+              </a:rPr>
+              <a:t>PersonService</a:t>
+            </a:r>
+          </a:p>
+        </p:txBody>
+      </p:sp>
+      <p:sp>
+        <p:nvSpPr>
+          <p:cNvPr id="6" name="Textfeld 5">
+            <a:extLst>
+              <a:ext uri="{FF2B5EF4-FFF2-40B4-BE49-F238E27FC236}">
+                <a16:creationId xmlns:a16="http://schemas.microsoft.com/office/drawing/2014/main" id="{CAE6670B-D17D-858C-3604-3307F1E5EE6E}"/>
+              </a:ext>
+            </a:extLst>
+          </p:cNvPr>
+          <p:cNvSpPr txBox="1"/>
+          <p:nvPr/>
+        </p:nvSpPr>
+        <p:spPr>
+          <a:xfrm>
+            <a:off x="5557524" y="793195"/>
+            <a:ext cx="2038708" cy="646331"/>
+          </a:xfrm>
+          <a:prstGeom prst="rect">
+            <a:avLst/>
+          </a:prstGeom>
+          <a:noFill/>
+        </p:spPr>
+        <p:txBody>
+          <a:bodyPr wrap="square" rtlCol="0">
+            <a:spAutoFit/>
+          </a:bodyPr>
+          <a:lstStyle/>
+          <a:p>
+            <a:pPr algn="ctr"/>
+            <a:r>
+              <a:rPr lang="de-CH" b="1" dirty="0">
+                <a:latin typeface="SBB Light" pitchFamily="2" charset="0"/>
+              </a:rPr>
+              <a:t>Controller</a:t>
+            </a:r>
+          </a:p>
+          <a:p>
+            <a:pPr algn="ctr"/>
+            <a:r>
+              <a:rPr lang="de-CH" dirty="0">
+                <a:latin typeface="SBB Light" pitchFamily="2" charset="0"/>
+              </a:rPr>
+              <a:t>PersonController</a:t>
+            </a:r>
+          </a:p>
+        </p:txBody>
+      </p:sp>
+      <p:sp>
+        <p:nvSpPr>
+          <p:cNvPr id="7" name="Textfeld 6">
+            <a:extLst>
+              <a:ext uri="{FF2B5EF4-FFF2-40B4-BE49-F238E27FC236}">
+                <a16:creationId xmlns:a16="http://schemas.microsoft.com/office/drawing/2014/main" id="{2214395B-5F3A-4763-5536-87301F634E10}"/>
+              </a:ext>
+            </a:extLst>
+          </p:cNvPr>
+          <p:cNvSpPr txBox="1"/>
+          <p:nvPr/>
+        </p:nvSpPr>
+        <p:spPr>
+          <a:xfrm>
+            <a:off x="3722627" y="1955381"/>
+            <a:ext cx="2038708" cy="646331"/>
+          </a:xfrm>
+          <a:prstGeom prst="rect">
+            <a:avLst/>
+          </a:prstGeom>
+          <a:noFill/>
+        </p:spPr>
+        <p:txBody>
+          <a:bodyPr wrap="square" rtlCol="0">
+            <a:spAutoFit/>
+          </a:bodyPr>
+          <a:lstStyle/>
+          <a:p>
+            <a:pPr algn="ctr"/>
+            <a:r>
+              <a:rPr lang="de-CH" b="1" dirty="0">
+                <a:latin typeface="SBB Light" pitchFamily="2" charset="0"/>
+              </a:rPr>
+              <a:t>Utility</a:t>
+            </a:r>
+          </a:p>
+          <a:p>
+            <a:pPr algn="ctr"/>
+            <a:r>
+              <a:rPr lang="de-CH" dirty="0">
+                <a:latin typeface="SBB Light" pitchFamily="2" charset="0"/>
+              </a:rPr>
+              <a:t>MyUtilityBean</a:t>
+            </a:r>
+          </a:p>
+        </p:txBody>
+      </p:sp>
+      <p:sp>
+        <p:nvSpPr>
+          <p:cNvPr id="8" name="Bogen 7">
+            <a:extLst>
+              <a:ext uri="{FF2B5EF4-FFF2-40B4-BE49-F238E27FC236}">
+                <a16:creationId xmlns:a16="http://schemas.microsoft.com/office/drawing/2014/main" id="{55243E72-C79D-D5C5-58C4-8A95F1770262}"/>
+              </a:ext>
+            </a:extLst>
+          </p:cNvPr>
+          <p:cNvSpPr/>
+          <p:nvPr/>
+        </p:nvSpPr>
+        <p:spPr>
+          <a:xfrm>
+            <a:off x="2295354" y="531225"/>
+            <a:ext cx="1631085" cy="1234204"/>
+          </a:xfrm>
+          <a:prstGeom prst="arc">
+            <a:avLst>
+              <a:gd name="adj1" fmla="val 16690684"/>
+              <a:gd name="adj2" fmla="val 4979617"/>
+            </a:avLst>
+          </a:prstGeom>
+        </p:spPr>
+        <p:style>
+          <a:lnRef idx="2">
+            <a:schemeClr val="dk1"/>
+          </a:lnRef>
+          <a:fillRef idx="0">
+            <a:schemeClr val="dk1"/>
+          </a:fillRef>
+          <a:effectRef idx="1">
+            <a:schemeClr val="dk1"/>
+          </a:effectRef>
+          <a:fontRef idx="minor">
+            <a:schemeClr val="tx1"/>
+          </a:fontRef>
+        </p:style>
+        <p:txBody>
+          <a:bodyPr rtlCol="0" anchor="ctr"/>
+          <a:lstStyle/>
+          <a:p>
+            <a:pPr algn="ctr"/>
+            <a:endParaRPr lang="de-CH" dirty="0"/>
+          </a:p>
+        </p:txBody>
+      </p:sp>
+      <p:sp>
+        <p:nvSpPr>
+          <p:cNvPr id="9" name="Bogen 8">
+            <a:extLst>
+              <a:ext uri="{FF2B5EF4-FFF2-40B4-BE49-F238E27FC236}">
+                <a16:creationId xmlns:a16="http://schemas.microsoft.com/office/drawing/2014/main" id="{22360D6B-4116-27D1-223C-70ABD31F412A}"/>
+              </a:ext>
+            </a:extLst>
+          </p:cNvPr>
+          <p:cNvSpPr/>
+          <p:nvPr/>
+        </p:nvSpPr>
+        <p:spPr>
+          <a:xfrm>
+            <a:off x="2432920" y="384921"/>
+            <a:ext cx="3236976" cy="1511808"/>
+          </a:xfrm>
+          <a:prstGeom prst="arc">
+            <a:avLst>
+              <a:gd name="adj1" fmla="val 19063385"/>
+              <a:gd name="adj2" fmla="val 2604375"/>
+            </a:avLst>
+          </a:prstGeom>
+        </p:spPr>
+        <p:style>
+          <a:lnRef idx="2">
+            <a:schemeClr val="dk1"/>
+          </a:lnRef>
+          <a:fillRef idx="0">
+            <a:schemeClr val="dk1"/>
+          </a:fillRef>
+          <a:effectRef idx="1">
+            <a:schemeClr val="dk1"/>
+          </a:effectRef>
+          <a:fontRef idx="minor">
+            <a:schemeClr val="tx1"/>
+          </a:fontRef>
+        </p:style>
+        <p:txBody>
+          <a:bodyPr rtlCol="0" anchor="ctr"/>
+          <a:lstStyle/>
+          <a:p>
+            <a:pPr algn="ctr"/>
+            <a:endParaRPr lang="de-CH" dirty="0"/>
+          </a:p>
+        </p:txBody>
+      </p:sp>
+      <p:sp>
+        <p:nvSpPr>
+          <p:cNvPr id="10" name="Bogen 9">
+            <a:extLst>
+              <a:ext uri="{FF2B5EF4-FFF2-40B4-BE49-F238E27FC236}">
+                <a16:creationId xmlns:a16="http://schemas.microsoft.com/office/drawing/2014/main" id="{1E5D31C7-ABB2-ACB5-6911-B461628E14AE}"/>
+              </a:ext>
+            </a:extLst>
+          </p:cNvPr>
+          <p:cNvSpPr/>
+          <p:nvPr/>
+        </p:nvSpPr>
+        <p:spPr>
+          <a:xfrm>
+            <a:off x="3932536" y="275193"/>
+            <a:ext cx="3675888" cy="1746268"/>
+          </a:xfrm>
+          <a:prstGeom prst="arc">
+            <a:avLst>
+              <a:gd name="adj1" fmla="val 18736987"/>
+              <a:gd name="adj2" fmla="val 2822498"/>
+            </a:avLst>
+          </a:prstGeom>
+        </p:spPr>
+        <p:style>
+          <a:lnRef idx="2">
+            <a:schemeClr val="dk1"/>
+          </a:lnRef>
+          <a:fillRef idx="0">
+            <a:schemeClr val="dk1"/>
+          </a:fillRef>
+          <a:effectRef idx="1">
+            <a:schemeClr val="dk1"/>
+          </a:effectRef>
+          <a:fontRef idx="minor">
+            <a:schemeClr val="tx1"/>
+          </a:fontRef>
+        </p:style>
+        <p:txBody>
+          <a:bodyPr rtlCol="0" anchor="ctr"/>
+          <a:lstStyle/>
+          <a:p>
+            <a:pPr algn="ctr"/>
+            <a:endParaRPr lang="de-CH" dirty="0"/>
+          </a:p>
+        </p:txBody>
+      </p:sp>
+      <p:cxnSp>
+        <p:nvCxnSpPr>
+          <p:cNvPr id="12" name="Verbinder: gewinkelt 11">
+            <a:extLst>
+              <a:ext uri="{FF2B5EF4-FFF2-40B4-BE49-F238E27FC236}">
+                <a16:creationId xmlns:a16="http://schemas.microsoft.com/office/drawing/2014/main" id="{EDDC4843-E69A-F607-E77F-82B7BD008A0F}"/>
+              </a:ext>
+            </a:extLst>
+          </p:cNvPr>
+          <p:cNvCxnSpPr>
+            <a:cxnSpLocks/>
+            <a:stCxn id="5" idx="2"/>
+            <a:endCxn id="14" idx="0"/>
+          </p:cNvCxnSpPr>
+          <p:nvPr/>
+        </p:nvCxnSpPr>
+        <p:spPr>
+          <a:xfrm rot="5400000">
+            <a:off x="4504225" y="1677283"/>
+            <a:ext cx="475514" cy="1"/>
+          </a:xfrm>
+          <a:prstGeom prst="bentConnector3">
+            <a:avLst/>
+          </a:prstGeom>
+          <a:ln>
+            <a:headEnd type="none"/>
+            <a:tailEnd type="arrow"/>
+          </a:ln>
+        </p:spPr>
+        <p:style>
+          <a:lnRef idx="2">
+            <a:schemeClr val="dk1"/>
+          </a:lnRef>
+          <a:fillRef idx="0">
+            <a:schemeClr val="dk1"/>
+          </a:fillRef>
+          <a:effectRef idx="1">
+            <a:schemeClr val="dk1"/>
+          </a:effectRef>
+          <a:fontRef idx="minor">
+            <a:schemeClr val="tx1"/>
+          </a:fontRef>
+        </p:style>
+      </p:cxnSp>
+      <p:sp>
+        <p:nvSpPr>
+          <p:cNvPr id="14" name="Rechteck: abgerundete Ecken 13">
+            <a:extLst>
+              <a:ext uri="{FF2B5EF4-FFF2-40B4-BE49-F238E27FC236}">
+                <a16:creationId xmlns:a16="http://schemas.microsoft.com/office/drawing/2014/main" id="{B83F6205-5409-D00E-38DA-A7B840E58487}"/>
+              </a:ext>
+            </a:extLst>
+          </p:cNvPr>
+          <p:cNvSpPr/>
+          <p:nvPr/>
+        </p:nvSpPr>
+        <p:spPr>
+          <a:xfrm>
+            <a:off x="3926439" y="1915040"/>
+            <a:ext cx="1631084" cy="691663"/>
+          </a:xfrm>
+          <a:prstGeom prst="roundRect">
+            <a:avLst/>
+          </a:prstGeom>
+          <a:noFill/>
+          <a:ln>
+            <a:solidFill>
+              <a:schemeClr val="tx1"/>
+            </a:solidFill>
+            <a:prstDash val="dash"/>
+          </a:ln>
+        </p:spPr>
+        <p:style>
+          <a:lnRef idx="2">
+            <a:schemeClr val="accent1">
+              <a:shade val="15000"/>
+            </a:schemeClr>
+          </a:lnRef>
+          <a:fillRef idx="1">
+            <a:schemeClr val="accent1"/>
+          </a:fillRef>
+          <a:effectRef idx="0">
+            <a:schemeClr val="accent1"/>
+          </a:effectRef>
+          <a:fontRef idx="minor">
+            <a:schemeClr val="lt1"/>
+          </a:fontRef>
+        </p:style>
+        <p:txBody>
+          <a:bodyPr rtlCol="0" anchor="ctr"/>
+          <a:lstStyle/>
+          <a:p>
+            <a:pPr algn="ctr"/>
+            <a:endParaRPr lang="de-CH" dirty="0"/>
+          </a:p>
+        </p:txBody>
+      </p:sp>
+      <p:sp>
+        <p:nvSpPr>
+          <p:cNvPr id="23" name="Zylinder 22">
+            <a:extLst>
+              <a:ext uri="{FF2B5EF4-FFF2-40B4-BE49-F238E27FC236}">
+                <a16:creationId xmlns:a16="http://schemas.microsoft.com/office/drawing/2014/main" id="{5E43EF65-3933-D626-7B2D-2612BDD100BB}"/>
+              </a:ext>
+            </a:extLst>
+          </p:cNvPr>
+          <p:cNvSpPr/>
+          <p:nvPr/>
+        </p:nvSpPr>
+        <p:spPr>
+          <a:xfrm>
+            <a:off x="468327" y="677713"/>
+            <a:ext cx="591671" cy="908299"/>
+          </a:xfrm>
+          <a:prstGeom prst="can">
+            <a:avLst/>
+          </a:prstGeom>
+          <a:noFill/>
+        </p:spPr>
+        <p:style>
+          <a:lnRef idx="2">
+            <a:schemeClr val="accent1">
+              <a:shade val="15000"/>
+            </a:schemeClr>
+          </a:lnRef>
+          <a:fillRef idx="1">
+            <a:schemeClr val="accent1"/>
+          </a:fillRef>
+          <a:effectRef idx="0">
+            <a:schemeClr val="accent1"/>
+          </a:effectRef>
+          <a:fontRef idx="minor">
+            <a:schemeClr val="lt1"/>
+          </a:fontRef>
+        </p:style>
+        <p:txBody>
+          <a:bodyPr rtlCol="0" anchor="ctr"/>
+          <a:lstStyle/>
+          <a:p>
+            <a:pPr algn="ctr"/>
+            <a:r>
+              <a:rPr lang="de-CH" sz="1400" dirty="0">
+                <a:solidFill>
+                  <a:schemeClr val="tx1"/>
+                </a:solidFill>
+                <a:latin typeface="SBB Light" pitchFamily="2" charset="0"/>
+              </a:rPr>
+              <a:t>Database</a:t>
+            </a:r>
+          </a:p>
+        </p:txBody>
+      </p:sp>
+      <p:sp>
+        <p:nvSpPr>
+          <p:cNvPr id="36" name="Geschweifte Klammer rechts 35">
+            <a:extLst>
+              <a:ext uri="{FF2B5EF4-FFF2-40B4-BE49-F238E27FC236}">
+                <a16:creationId xmlns:a16="http://schemas.microsoft.com/office/drawing/2014/main" id="{E32EB46F-080C-67C4-5CBD-D674CF2358C1}"/>
+              </a:ext>
+            </a:extLst>
+          </p:cNvPr>
+          <p:cNvSpPr/>
+          <p:nvPr/>
+        </p:nvSpPr>
+        <p:spPr>
+          <a:xfrm rot="5400000">
+            <a:off x="4570651" y="1979532"/>
+            <a:ext cx="343921" cy="1720443"/>
+          </a:xfrm>
+          <a:prstGeom prst="rightBrace">
+            <a:avLst>
+              <a:gd name="adj1" fmla="val 82622"/>
+              <a:gd name="adj2" fmla="val 50000"/>
+            </a:avLst>
+          </a:prstGeom>
+          <a:ln>
+            <a:solidFill>
+              <a:schemeClr val="accent5">
+                <a:lumMod val="60000"/>
+                <a:lumOff val="40000"/>
+              </a:schemeClr>
+            </a:solidFill>
+          </a:ln>
+        </p:spPr>
+        <p:style>
+          <a:lnRef idx="2">
+            <a:schemeClr val="dk1"/>
+          </a:lnRef>
+          <a:fillRef idx="0">
+            <a:schemeClr val="dk1"/>
+          </a:fillRef>
+          <a:effectRef idx="1">
+            <a:schemeClr val="dk1"/>
+          </a:effectRef>
+          <a:fontRef idx="minor">
+            <a:schemeClr val="tx1"/>
+          </a:fontRef>
+        </p:style>
+        <p:txBody>
+          <a:bodyPr rtlCol="0" anchor="ctr"/>
+          <a:lstStyle/>
+          <a:p>
+            <a:pPr algn="ctr"/>
+            <a:endParaRPr lang="de-CH" dirty="0">
+              <a:solidFill>
+                <a:srgbClr val="00B050"/>
+              </a:solidFill>
+            </a:endParaRPr>
+          </a:p>
+        </p:txBody>
+      </p:sp>
+      <p:sp>
+        <p:nvSpPr>
+          <p:cNvPr id="37" name="Textfeld 36">
+            <a:extLst>
+              <a:ext uri="{FF2B5EF4-FFF2-40B4-BE49-F238E27FC236}">
+                <a16:creationId xmlns:a16="http://schemas.microsoft.com/office/drawing/2014/main" id="{20557BC2-8010-4B87-0590-8438D7D97B23}"/>
+              </a:ext>
+            </a:extLst>
+          </p:cNvPr>
+          <p:cNvSpPr txBox="1"/>
+          <p:nvPr/>
+        </p:nvSpPr>
+        <p:spPr>
+          <a:xfrm>
+            <a:off x="3721964" y="3011713"/>
+            <a:ext cx="2038708" cy="369332"/>
+          </a:xfrm>
+          <a:prstGeom prst="rect">
+            <a:avLst/>
+          </a:prstGeom>
+          <a:noFill/>
+        </p:spPr>
+        <p:txBody>
+          <a:bodyPr wrap="square" rtlCol="0">
+            <a:spAutoFit/>
+          </a:bodyPr>
+          <a:lstStyle/>
+          <a:p>
+            <a:pPr algn="ctr"/>
+            <a:r>
+              <a:rPr lang="de-CH" dirty="0">
+                <a:solidFill>
+                  <a:schemeClr val="accent5">
+                    <a:lumMod val="60000"/>
+                    <a:lumOff val="40000"/>
+                  </a:schemeClr>
+                </a:solidFill>
+                <a:latin typeface="SBB Light" pitchFamily="2" charset="0"/>
+              </a:rPr>
+              <a:t>Mockito-Test</a:t>
+            </a:r>
+          </a:p>
+        </p:txBody>
+      </p:sp>
+      <p:sp>
+        <p:nvSpPr>
+          <p:cNvPr id="38" name="Textfeld 37">
+            <a:extLst>
+              <a:ext uri="{FF2B5EF4-FFF2-40B4-BE49-F238E27FC236}">
+                <a16:creationId xmlns:a16="http://schemas.microsoft.com/office/drawing/2014/main" id="{49737C48-26BB-6E3B-4765-5F6473884117}"/>
+              </a:ext>
+            </a:extLst>
+          </p:cNvPr>
+          <p:cNvSpPr txBox="1"/>
+          <p:nvPr/>
+        </p:nvSpPr>
+        <p:spPr>
+          <a:xfrm>
+            <a:off x="3176685" y="2827047"/>
+            <a:ext cx="902571" cy="369332"/>
+          </a:xfrm>
+          <a:prstGeom prst="rect">
+            <a:avLst/>
+          </a:prstGeom>
+          <a:noFill/>
+        </p:spPr>
+        <p:txBody>
+          <a:bodyPr wrap="square" rtlCol="0">
+            <a:spAutoFit/>
+          </a:bodyPr>
+          <a:lstStyle/>
+          <a:p>
+            <a:pPr algn="ctr"/>
+            <a:r>
+              <a:rPr lang="de-CH" dirty="0">
+                <a:solidFill>
+                  <a:schemeClr val="accent5">
+                    <a:lumMod val="60000"/>
+                    <a:lumOff val="40000"/>
+                  </a:schemeClr>
+                </a:solidFill>
+                <a:latin typeface="SBB Light" pitchFamily="2" charset="0"/>
+              </a:rPr>
+              <a:t>Mock</a:t>
+            </a:r>
+          </a:p>
+        </p:txBody>
+      </p:sp>
+      <p:cxnSp>
+        <p:nvCxnSpPr>
+          <p:cNvPr id="39" name="Gerader Verbinder 38">
+            <a:extLst>
+              <a:ext uri="{FF2B5EF4-FFF2-40B4-BE49-F238E27FC236}">
+                <a16:creationId xmlns:a16="http://schemas.microsoft.com/office/drawing/2014/main" id="{148949EC-B2F7-CD35-E626-578F2C5E9A00}"/>
+              </a:ext>
+            </a:extLst>
+          </p:cNvPr>
+          <p:cNvCxnSpPr>
+            <a:cxnSpLocks/>
+            <a:stCxn id="38" idx="0"/>
+          </p:cNvCxnSpPr>
+          <p:nvPr/>
+        </p:nvCxnSpPr>
+        <p:spPr>
+          <a:xfrm flipH="1" flipV="1">
+            <a:off x="3475153" y="1896729"/>
+            <a:ext cx="152818" cy="930318"/>
+          </a:xfrm>
+          <a:prstGeom prst="line">
+            <a:avLst/>
+          </a:prstGeom>
+          <a:ln>
+            <a:solidFill>
+              <a:schemeClr val="accent5">
+                <a:lumMod val="60000"/>
+                <a:lumOff val="40000"/>
+              </a:schemeClr>
+            </a:solidFill>
+          </a:ln>
+        </p:spPr>
+        <p:style>
+          <a:lnRef idx="2">
+            <a:schemeClr val="accent1"/>
+          </a:lnRef>
+          <a:fillRef idx="0">
+            <a:schemeClr val="accent1"/>
+          </a:fillRef>
+          <a:effectRef idx="1">
+            <a:schemeClr val="accent1"/>
+          </a:effectRef>
+          <a:fontRef idx="minor">
+            <a:schemeClr val="tx1"/>
+          </a:fontRef>
+        </p:style>
+      </p:cxnSp>
+      <p:sp>
+        <p:nvSpPr>
+          <p:cNvPr id="42" name="Textfeld 41">
+            <a:extLst>
+              <a:ext uri="{FF2B5EF4-FFF2-40B4-BE49-F238E27FC236}">
+                <a16:creationId xmlns:a16="http://schemas.microsoft.com/office/drawing/2014/main" id="{70D285F2-1635-129C-7AC2-6F2EF0C4FA6D}"/>
+              </a:ext>
+            </a:extLst>
+          </p:cNvPr>
+          <p:cNvSpPr txBox="1"/>
+          <p:nvPr/>
+        </p:nvSpPr>
+        <p:spPr>
+          <a:xfrm>
+            <a:off x="5557523" y="2839752"/>
+            <a:ext cx="902571" cy="369332"/>
+          </a:xfrm>
+          <a:prstGeom prst="rect">
+            <a:avLst/>
+          </a:prstGeom>
+          <a:noFill/>
+        </p:spPr>
+        <p:txBody>
+          <a:bodyPr wrap="square" rtlCol="0">
+            <a:spAutoFit/>
+          </a:bodyPr>
+          <a:lstStyle/>
+          <a:p>
+            <a:pPr algn="ctr"/>
+            <a:r>
+              <a:rPr lang="de-CH" dirty="0">
+                <a:solidFill>
+                  <a:schemeClr val="accent5">
+                    <a:lumMod val="60000"/>
+                    <a:lumOff val="40000"/>
+                  </a:schemeClr>
+                </a:solidFill>
+                <a:latin typeface="SBB Light" pitchFamily="2" charset="0"/>
+              </a:rPr>
+              <a:t>Test </a:t>
+            </a:r>
+          </a:p>
+        </p:txBody>
+      </p:sp>
+      <p:cxnSp>
+        <p:nvCxnSpPr>
+          <p:cNvPr id="43" name="Gerader Verbinder 42">
+            <a:extLst>
+              <a:ext uri="{FF2B5EF4-FFF2-40B4-BE49-F238E27FC236}">
+                <a16:creationId xmlns:a16="http://schemas.microsoft.com/office/drawing/2014/main" id="{37DBCF58-A4BF-B2A3-8578-29D3E205F5E4}"/>
+              </a:ext>
+            </a:extLst>
+          </p:cNvPr>
+          <p:cNvCxnSpPr>
+            <a:cxnSpLocks/>
+            <a:endCxn id="42" idx="0"/>
+          </p:cNvCxnSpPr>
+          <p:nvPr/>
+        </p:nvCxnSpPr>
+        <p:spPr>
+          <a:xfrm>
+            <a:off x="5627220" y="1505184"/>
+            <a:ext cx="381589" cy="1334568"/>
+          </a:xfrm>
+          <a:prstGeom prst="line">
+            <a:avLst/>
+          </a:prstGeom>
+          <a:ln>
+            <a:solidFill>
+              <a:schemeClr val="accent5">
+                <a:lumMod val="60000"/>
+                <a:lumOff val="40000"/>
+              </a:schemeClr>
+            </a:solidFill>
+          </a:ln>
+        </p:spPr>
+        <p:style>
+          <a:lnRef idx="2">
+            <a:schemeClr val="accent1"/>
+          </a:lnRef>
+          <a:fillRef idx="0">
+            <a:schemeClr val="accent1"/>
+          </a:fillRef>
+          <a:effectRef idx="1">
+            <a:schemeClr val="accent1"/>
+          </a:effectRef>
+          <a:fontRef idx="minor">
+            <a:schemeClr val="tx1"/>
+          </a:fontRef>
+        </p:style>
+      </p:cxnSp>
+      <p:cxnSp>
+        <p:nvCxnSpPr>
+          <p:cNvPr id="11" name="Gerader Verbinder 10">
+            <a:extLst>
+              <a:ext uri="{FF2B5EF4-FFF2-40B4-BE49-F238E27FC236}">
+                <a16:creationId xmlns:a16="http://schemas.microsoft.com/office/drawing/2014/main" id="{E7B0DA91-0ACC-412F-96A8-5A36C2A388D5}"/>
+              </a:ext>
+            </a:extLst>
+          </p:cNvPr>
+          <p:cNvCxnSpPr>
+            <a:cxnSpLocks/>
+          </p:cNvCxnSpPr>
+          <p:nvPr/>
+        </p:nvCxnSpPr>
+        <p:spPr>
+          <a:xfrm flipV="1">
+            <a:off x="3882392" y="732235"/>
+            <a:ext cx="29081" cy="1929888"/>
+          </a:xfrm>
+          <a:prstGeom prst="line">
+            <a:avLst/>
+          </a:prstGeom>
+          <a:ln>
+            <a:solidFill>
+              <a:schemeClr val="accent5">
+                <a:lumMod val="60000"/>
+                <a:lumOff val="40000"/>
+              </a:schemeClr>
+            </a:solidFill>
+          </a:ln>
+        </p:spPr>
+        <p:style>
+          <a:lnRef idx="2">
+            <a:schemeClr val="accent1"/>
+          </a:lnRef>
+          <a:fillRef idx="0">
+            <a:schemeClr val="accent1"/>
+          </a:fillRef>
+          <a:effectRef idx="1">
+            <a:schemeClr val="accent1"/>
+          </a:effectRef>
+          <a:fontRef idx="minor">
+            <a:schemeClr val="tx1"/>
+          </a:fontRef>
+        </p:style>
+      </p:cxnSp>
+      <p:pic>
+        <p:nvPicPr>
+          <p:cNvPr id="17" name="Grafik 16">
+            <a:extLst>
+              <a:ext uri="{FF2B5EF4-FFF2-40B4-BE49-F238E27FC236}">
+                <a16:creationId xmlns:a16="http://schemas.microsoft.com/office/drawing/2014/main" id="{01D7467E-68A8-1D3B-9C1D-D311948D1432}"/>
+              </a:ext>
+            </a:extLst>
+          </p:cNvPr>
+          <p:cNvPicPr>
+            <a:picLocks noChangeAspect="1"/>
+          </p:cNvPicPr>
+          <p:nvPr/>
+        </p:nvPicPr>
+        <p:blipFill>
+          <a:blip r:embed="rId2"/>
+          <a:stretch>
+            <a:fillRect/>
+          </a:stretch>
+        </p:blipFill>
+        <p:spPr>
+          <a:xfrm>
+            <a:off x="5594446" y="731899"/>
+            <a:ext cx="48772" cy="1944793"/>
+          </a:xfrm>
+          <a:prstGeom prst="rect">
+            <a:avLst/>
+          </a:prstGeom>
+        </p:spPr>
+      </p:pic>
+    </p:spTree>
+    <p:extLst>
+      <p:ext uri="{BB962C8B-B14F-4D97-AF65-F5344CB8AC3E}">
+        <p14:creationId xmlns:p14="http://schemas.microsoft.com/office/powerpoint/2010/main" val="1718645862"/>
       </p:ext>
     </p:extLst>
   </p:cSld>

</xml_diff>

<commit_message>
feature(springboottesting): fixed image width
</commit_message>
<xml_diff>
--- a/content/en/docs/java/spring-boot/spring-boot-testing/zwiebelprinzip.pptx
+++ b/content/en/docs/java/spring-boot/spring-boot-testing/zwiebelprinzip.pptx
@@ -263,7 +263,7 @@
           <a:p>
             <a:fld id="{CC485AA8-D36E-4B31-9BCC-E3E7E8DC6EC0}" type="datetimeFigureOut">
               <a:rPr lang="de-CH" smtClean="0"/>
-              <a:t>31.10.2024</a:t>
+              <a:t>04.11.2024</a:t>
             </a:fld>
             <a:endParaRPr lang="de-CH" dirty="0"/>
           </a:p>
@@ -463,7 +463,7 @@
           <a:p>
             <a:fld id="{CC485AA8-D36E-4B31-9BCC-E3E7E8DC6EC0}" type="datetimeFigureOut">
               <a:rPr lang="de-CH" smtClean="0"/>
-              <a:t>31.10.2024</a:t>
+              <a:t>04.11.2024</a:t>
             </a:fld>
             <a:endParaRPr lang="de-CH" dirty="0"/>
           </a:p>
@@ -673,7 +673,7 @@
           <a:p>
             <a:fld id="{CC485AA8-D36E-4B31-9BCC-E3E7E8DC6EC0}" type="datetimeFigureOut">
               <a:rPr lang="de-CH" smtClean="0"/>
-              <a:t>31.10.2024</a:t>
+              <a:t>04.11.2024</a:t>
             </a:fld>
             <a:endParaRPr lang="de-CH" dirty="0"/>
           </a:p>
@@ -873,7 +873,7 @@
           <a:p>
             <a:fld id="{CC485AA8-D36E-4B31-9BCC-E3E7E8DC6EC0}" type="datetimeFigureOut">
               <a:rPr lang="de-CH" smtClean="0"/>
-              <a:t>31.10.2024</a:t>
+              <a:t>04.11.2024</a:t>
             </a:fld>
             <a:endParaRPr lang="de-CH" dirty="0"/>
           </a:p>
@@ -1149,7 +1149,7 @@
           <a:p>
             <a:fld id="{CC485AA8-D36E-4B31-9BCC-E3E7E8DC6EC0}" type="datetimeFigureOut">
               <a:rPr lang="de-CH" smtClean="0"/>
-              <a:t>31.10.2024</a:t>
+              <a:t>04.11.2024</a:t>
             </a:fld>
             <a:endParaRPr lang="de-CH" dirty="0"/>
           </a:p>
@@ -1417,7 +1417,7 @@
           <a:p>
             <a:fld id="{CC485AA8-D36E-4B31-9BCC-E3E7E8DC6EC0}" type="datetimeFigureOut">
               <a:rPr lang="de-CH" smtClean="0"/>
-              <a:t>31.10.2024</a:t>
+              <a:t>04.11.2024</a:t>
             </a:fld>
             <a:endParaRPr lang="de-CH" dirty="0"/>
           </a:p>
@@ -1832,7 +1832,7 @@
           <a:p>
             <a:fld id="{CC485AA8-D36E-4B31-9BCC-E3E7E8DC6EC0}" type="datetimeFigureOut">
               <a:rPr lang="de-CH" smtClean="0"/>
-              <a:t>31.10.2024</a:t>
+              <a:t>04.11.2024</a:t>
             </a:fld>
             <a:endParaRPr lang="de-CH" dirty="0"/>
           </a:p>
@@ -1974,7 +1974,7 @@
           <a:p>
             <a:fld id="{CC485AA8-D36E-4B31-9BCC-E3E7E8DC6EC0}" type="datetimeFigureOut">
               <a:rPr lang="de-CH" smtClean="0"/>
-              <a:t>31.10.2024</a:t>
+              <a:t>04.11.2024</a:t>
             </a:fld>
             <a:endParaRPr lang="de-CH" dirty="0"/>
           </a:p>
@@ -2087,7 +2087,7 @@
           <a:p>
             <a:fld id="{CC485AA8-D36E-4B31-9BCC-E3E7E8DC6EC0}" type="datetimeFigureOut">
               <a:rPr lang="de-CH" smtClean="0"/>
-              <a:t>31.10.2024</a:t>
+              <a:t>04.11.2024</a:t>
             </a:fld>
             <a:endParaRPr lang="de-CH" dirty="0"/>
           </a:p>
@@ -2400,7 +2400,7 @@
           <a:p>
             <a:fld id="{CC485AA8-D36E-4B31-9BCC-E3E7E8DC6EC0}" type="datetimeFigureOut">
               <a:rPr lang="de-CH" smtClean="0"/>
-              <a:t>31.10.2024</a:t>
+              <a:t>04.11.2024</a:t>
             </a:fld>
             <a:endParaRPr lang="de-CH" dirty="0"/>
           </a:p>
@@ -2689,7 +2689,7 @@
           <a:p>
             <a:fld id="{CC485AA8-D36E-4B31-9BCC-E3E7E8DC6EC0}" type="datetimeFigureOut">
               <a:rPr lang="de-CH" smtClean="0"/>
-              <a:t>31.10.2024</a:t>
+              <a:t>04.11.2024</a:t>
             </a:fld>
             <a:endParaRPr lang="de-CH" dirty="0"/>
           </a:p>
@@ -2932,7 +2932,7 @@
           <a:p>
             <a:fld id="{CC485AA8-D36E-4B31-9BCC-E3E7E8DC6EC0}" type="datetimeFigureOut">
               <a:rPr lang="de-CH" smtClean="0"/>
-              <a:t>31.10.2024</a:t>
+              <a:t>04.11.2024</a:t>
             </a:fld>
             <a:endParaRPr lang="de-CH" dirty="0"/>
           </a:p>
@@ -4634,7 +4634,7 @@
         <p:spPr>
           <a:xfrm>
             <a:off x="4355332" y="5830414"/>
-            <a:ext cx="2038708" cy="369332"/>
+            <a:ext cx="2038708" cy="307777"/>
           </a:xfrm>
           <a:prstGeom prst="rect">
             <a:avLst/>
@@ -4649,7 +4649,7 @@
           <a:p>
             <a:pPr algn="ctr"/>
             <a:r>
-              <a:rPr lang="de-CH" dirty="0">
+              <a:rPr lang="de-CH" sz="1400" dirty="0">
                 <a:solidFill>
                   <a:schemeClr val="accent5">
                     <a:lumMod val="60000"/>
@@ -4658,7 +4658,7 @@
                 </a:solidFill>
                 <a:latin typeface="SBB Light" pitchFamily="2" charset="0"/>
               </a:rPr>
-              <a:t>Mockito-Test</a:t>
+              <a:t>UUT: Mockito-Test</a:t>
             </a:r>
           </a:p>
         </p:txBody>
@@ -6129,7 +6129,7 @@
         <p:spPr>
           <a:xfrm>
             <a:off x="3721964" y="3011713"/>
-            <a:ext cx="2038708" cy="369332"/>
+            <a:ext cx="2038708" cy="307777"/>
           </a:xfrm>
           <a:prstGeom prst="rect">
             <a:avLst/>
@@ -6144,7 +6144,7 @@
           <a:p>
             <a:pPr algn="ctr"/>
             <a:r>
-              <a:rPr lang="de-CH" dirty="0">
+              <a:rPr lang="de-CH" sz="1400" dirty="0">
                 <a:solidFill>
                   <a:schemeClr val="accent5">
                     <a:lumMod val="60000"/>
@@ -6153,7 +6153,7 @@
                 </a:solidFill>
                 <a:latin typeface="SBB Light" pitchFamily="2" charset="0"/>
               </a:rPr>
-              <a:t>Mockito-Test</a:t>
+              <a:t>UUT: Mockito-Test</a:t>
             </a:r>
           </a:p>
         </p:txBody>

</xml_diff>

<commit_message>
feature(springboottesting): ongoing, chapter DataJpaTest completed
</commit_message>
<xml_diff>
--- a/content/en/docs/java/spring-boot/spring-boot-testing/zwiebelprinzip.pptx
+++ b/content/en/docs/java/spring-boot/spring-boot-testing/zwiebelprinzip.pptx
@@ -7159,7 +7159,7 @@
         </p:nvSpPr>
         <p:spPr>
           <a:xfrm>
-            <a:off x="8364074" y="728141"/>
+            <a:off x="6113660" y="560820"/>
             <a:ext cx="902571" cy="369332"/>
           </a:xfrm>
           <a:prstGeom prst="rect">
@@ -7205,8 +7205,8 @@
         </p:nvCxnSpPr>
         <p:spPr>
           <a:xfrm flipH="1">
-            <a:off x="8229600" y="1184704"/>
-            <a:ext cx="379206" cy="502980"/>
+            <a:off x="6214245" y="912807"/>
+            <a:ext cx="350701" cy="745551"/>
           </a:xfrm>
           <a:prstGeom prst="line">
             <a:avLst/>

</xml_diff>